<commit_message>
tirando palavras de censura
</commit_message>
<xml_diff>
--- a/Regex.pptx
+++ b/Regex.pptx
@@ -112,6 +112,11 @@
       </a:defRPr>
     </a:lvl9pPr>
   </p:defaultTextStyle>
+  <p:extLst>
+    <p:ext uri="{EFAFB233-063F-42B5-8137-9DF3F51BA10A}">
+      <p15:sldGuideLst xmlns:p15="http://schemas.microsoft.com/office/powerpoint/2012/main"/>
+    </p:ext>
+  </p:extLst>
 </p:presentation>
 </file>
 
@@ -301,7 +306,7 @@
           <a:p>
             <a:fld id="{4AAD347D-5ACD-4C99-B74B-A9C85AD731AF}" type="datetimeFigureOut">
               <a:rPr lang="en-US" dirty="0"/>
-              <a:t>9/9/2025</a:t>
+              <a:t>9/11/2025</a:t>
             </a:fld>
             <a:endParaRPr lang="en-US" dirty="0"/>
           </a:p>
@@ -571,7 +576,7 @@
           <a:p>
             <a:fld id="{4509A250-FF31-4206-8172-F9D3106AACB1}" type="datetimeFigureOut">
               <a:rPr lang="en-US" dirty="0"/>
-              <a:t>9/9/2025</a:t>
+              <a:t>9/11/2025</a:t>
             </a:fld>
             <a:endParaRPr lang="en-US" dirty="0"/>
           </a:p>
@@ -760,7 +765,7 @@
           <a:p>
             <a:fld id="{4509A250-FF31-4206-8172-F9D3106AACB1}" type="datetimeFigureOut">
               <a:rPr lang="en-US" dirty="0"/>
-              <a:t>9/9/2025</a:t>
+              <a:t>9/11/2025</a:t>
             </a:fld>
             <a:endParaRPr lang="en-US" dirty="0"/>
           </a:p>
@@ -1028,7 +1033,7 @@
           <a:p>
             <a:fld id="{4509A250-FF31-4206-8172-F9D3106AACB1}" type="datetimeFigureOut">
               <a:rPr lang="en-US" dirty="0"/>
-              <a:t>9/9/2025</a:t>
+              <a:t>9/11/2025</a:t>
             </a:fld>
             <a:endParaRPr lang="en-US" dirty="0"/>
           </a:p>
@@ -1364,7 +1369,7 @@
           <a:p>
             <a:fld id="{4509A250-FF31-4206-8172-F9D3106AACB1}" type="datetimeFigureOut">
               <a:rPr lang="en-US" dirty="0"/>
-              <a:t>9/9/2025</a:t>
+              <a:t>9/11/2025</a:t>
             </a:fld>
             <a:endParaRPr lang="en-US" dirty="0"/>
           </a:p>
@@ -1982,7 +1987,7 @@
           <a:p>
             <a:fld id="{4509A250-FF31-4206-8172-F9D3106AACB1}" type="datetimeFigureOut">
               <a:rPr lang="en-US" dirty="0"/>
-              <a:t>9/9/2025</a:t>
+              <a:t>9/11/2025</a:t>
             </a:fld>
             <a:endParaRPr lang="en-US" dirty="0"/>
           </a:p>
@@ -2837,7 +2842,7 @@
           <a:p>
             <a:fld id="{4509A250-FF31-4206-8172-F9D3106AACB1}" type="datetimeFigureOut">
               <a:rPr lang="en-US" dirty="0"/>
-              <a:t>9/9/2025</a:t>
+              <a:t>9/11/2025</a:t>
             </a:fld>
             <a:endParaRPr lang="en-US" dirty="0"/>
           </a:p>
@@ -3002,7 +3007,7 @@
           <a:p>
             <a:fld id="{4509A250-FF31-4206-8172-F9D3106AACB1}" type="datetimeFigureOut">
               <a:rPr lang="en-US" dirty="0"/>
-              <a:t>9/9/2025</a:t>
+              <a:t>9/11/2025</a:t>
             </a:fld>
             <a:endParaRPr lang="en-US" dirty="0"/>
           </a:p>
@@ -3177,7 +3182,7 @@
           <a:p>
             <a:fld id="{4509A250-FF31-4206-8172-F9D3106AACB1}" type="datetimeFigureOut">
               <a:rPr lang="en-US" dirty="0"/>
-              <a:t>9/9/2025</a:t>
+              <a:t>9/11/2025</a:t>
             </a:fld>
             <a:endParaRPr lang="en-US" dirty="0"/>
           </a:p>
@@ -3342,7 +3347,7 @@
           <a:p>
             <a:fld id="{4509A250-FF31-4206-8172-F9D3106AACB1}" type="datetimeFigureOut">
               <a:rPr lang="en-US" dirty="0"/>
-              <a:t>9/9/2025</a:t>
+              <a:t>9/11/2025</a:t>
             </a:fld>
             <a:endParaRPr lang="en-US" dirty="0"/>
           </a:p>
@@ -3584,7 +3589,7 @@
           <a:p>
             <a:fld id="{9796027F-7875-4030-9381-8BD8C4F21935}" type="datetimeFigureOut">
               <a:rPr lang="en-US" dirty="0"/>
-              <a:t>9/9/2025</a:t>
+              <a:t>9/11/2025</a:t>
             </a:fld>
             <a:endParaRPr lang="en-US" dirty="0"/>
           </a:p>
@@ -3871,7 +3876,7 @@
           <a:p>
             <a:fld id="{9796027F-7875-4030-9381-8BD8C4F21935}" type="datetimeFigureOut">
               <a:rPr lang="en-US" dirty="0"/>
-              <a:t>9/9/2025</a:t>
+              <a:t>9/11/2025</a:t>
             </a:fld>
             <a:endParaRPr lang="en-US" dirty="0"/>
           </a:p>
@@ -4310,7 +4315,7 @@
           <a:p>
             <a:fld id="{9796027F-7875-4030-9381-8BD8C4F21935}" type="datetimeFigureOut">
               <a:rPr lang="en-US" dirty="0"/>
-              <a:t>9/9/2025</a:t>
+              <a:t>9/11/2025</a:t>
             </a:fld>
             <a:endParaRPr lang="en-US" dirty="0"/>
           </a:p>
@@ -4423,7 +4428,7 @@
           <a:p>
             <a:fld id="{4509A250-FF31-4206-8172-F9D3106AACB1}" type="datetimeFigureOut">
               <a:rPr lang="en-US" dirty="0"/>
-              <a:t>9/9/2025</a:t>
+              <a:t>9/11/2025</a:t>
             </a:fld>
             <a:endParaRPr lang="en-US" dirty="0"/>
           </a:p>
@@ -4513,7 +4518,7 @@
           <a:p>
             <a:fld id="{4509A250-FF31-4206-8172-F9D3106AACB1}" type="datetimeFigureOut">
               <a:rPr lang="en-US" dirty="0"/>
-              <a:t>9/9/2025</a:t>
+              <a:t>9/11/2025</a:t>
             </a:fld>
             <a:endParaRPr lang="en-US" dirty="0"/>
           </a:p>
@@ -4787,7 +4792,7 @@
           <a:p>
             <a:fld id="{4509A250-FF31-4206-8172-F9D3106AACB1}" type="datetimeFigureOut">
               <a:rPr lang="en-US" dirty="0"/>
-              <a:t>9/9/2025</a:t>
+              <a:t>9/11/2025</a:t>
             </a:fld>
             <a:endParaRPr lang="en-US" dirty="0"/>
           </a:p>
@@ -5057,7 +5062,7 @@
           <a:p>
             <a:fld id="{4509A250-FF31-4206-8172-F9D3106AACB1}" type="datetimeFigureOut">
               <a:rPr lang="en-US" dirty="0"/>
-              <a:t>9/9/2025</a:t>
+              <a:t>9/11/2025</a:t>
             </a:fld>
             <a:endParaRPr lang="en-US" dirty="0"/>
           </a:p>
@@ -5481,7 +5486,7 @@
           <a:p>
             <a:fld id="{4AAD347D-5ACD-4C99-B74B-A9C85AD731AF}" type="datetimeFigureOut">
               <a:rPr lang="en-US" dirty="0"/>
-              <a:t>9/9/2025</a:t>
+              <a:t>9/11/2025</a:t>
             </a:fld>
             <a:endParaRPr lang="en-US" dirty="0"/>
           </a:p>
@@ -6539,7 +6544,7 @@
         </p:spPr>
         <p:txBody>
           <a:bodyPr>
-            <a:normAutofit lnSpcReduction="10000"/>
+            <a:normAutofit fontScale="92500" lnSpcReduction="20000"/>
           </a:bodyPr>
           <a:lstStyle/>
           <a:p>
@@ -6553,6 +6558,11 @@
               </a:rPr>
               <a:t>REGEX – PRIMEIROS PASSOS PARA IMPLANTAÇÃO EM UM EXEMPLO PRÁTICO</a:t>
             </a:r>
+          </a:p>
+          <a:p>
+            <a:pPr marL="0" indent="0">
+              <a:buNone/>
+            </a:pPr>
             <a:endParaRPr lang="pt-BR" sz="1800" kern="100" dirty="0">
               <a:latin typeface="Arial" panose="020B0604020202020204" pitchFamily="34" charset="0"/>
               <a:cs typeface="Times New Roman" panose="02020603050405020304" pitchFamily="18" charset="0"/>

</xml_diff>

<commit_message>
alteração do ppt regex
</commit_message>
<xml_diff>
--- a/Regex.pptx
+++ b/Regex.pptx
@@ -6275,6 +6275,164 @@
           </a:prstGeom>
         </p:spPr>
       </p:pic>
+      <p:sp>
+        <p:nvSpPr>
+          <p:cNvPr id="4" name="CaixaDeTexto 3">
+            <a:extLst>
+              <a:ext uri="{FF2B5EF4-FFF2-40B4-BE49-F238E27FC236}">
+                <a16:creationId xmlns:a16="http://schemas.microsoft.com/office/drawing/2014/main" id="{BD9F8D67-03F7-EFFB-B3F9-A92F7DE6A678}"/>
+              </a:ext>
+            </a:extLst>
+          </p:cNvPr>
+          <p:cNvSpPr txBox="1"/>
+          <p:nvPr/>
+        </p:nvSpPr>
+        <p:spPr>
+          <a:xfrm>
+            <a:off x="1683026" y="3241020"/>
+            <a:ext cx="8865704" cy="646331"/>
+          </a:xfrm>
+          <a:prstGeom prst="rect">
+            <a:avLst/>
+          </a:prstGeom>
+          <a:noFill/>
+        </p:spPr>
+        <p:txBody>
+          <a:bodyPr wrap="square">
+            <a:spAutoFit/>
+          </a:bodyPr>
+          <a:lstStyle/>
+          <a:p>
+            <a:r>
+              <a:rPr lang="pt-BR" altLang="pt-BR" sz="3600" b="1" dirty="0">
+                <a:solidFill>
+                  <a:schemeClr val="tx1">
+                    <a:lumMod val="95000"/>
+                  </a:schemeClr>
+                </a:solidFill>
+                <a:latin typeface="Arial" panose="020B0604020202020204" pitchFamily="34" charset="0"/>
+                <a:cs typeface="Arial" panose="020B0604020202020204" pitchFamily="34" charset="0"/>
+              </a:rPr>
+              <a:t>^</a:t>
+            </a:r>
+            <a:r>
+              <a:rPr kumimoji="0" lang="pt-BR" altLang="pt-BR" sz="3600" b="1" i="0" u="none" strike="noStrike" cap="none" normalizeH="0" baseline="0" dirty="0">
+                <a:ln>
+                  <a:noFill/>
+                </a:ln>
+                <a:solidFill>
+                  <a:schemeClr val="tx1">
+                    <a:lumMod val="95000"/>
+                  </a:schemeClr>
+                </a:solidFill>
+                <a:effectLst/>
+                <a:latin typeface="Arial" panose="020B0604020202020204" pitchFamily="34" charset="0"/>
+                <a:cs typeface="Arial" panose="020B0604020202020204" pitchFamily="34" charset="0"/>
+              </a:rPr>
+              <a:t>[A-</a:t>
+            </a:r>
+            <a:r>
+              <a:rPr kumimoji="0" lang="pt-BR" altLang="pt-BR" sz="3600" b="1" i="0" u="none" strike="noStrike" cap="none" normalizeH="0" baseline="0" dirty="0" err="1">
+                <a:ln>
+                  <a:noFill/>
+                </a:ln>
+                <a:solidFill>
+                  <a:schemeClr val="tx1">
+                    <a:lumMod val="95000"/>
+                  </a:schemeClr>
+                </a:solidFill>
+                <a:effectLst/>
+                <a:latin typeface="Arial" panose="020B0604020202020204" pitchFamily="34" charset="0"/>
+                <a:cs typeface="Arial" panose="020B0604020202020204" pitchFamily="34" charset="0"/>
+              </a:rPr>
+              <a:t>zÀ</a:t>
+            </a:r>
+            <a:r>
+              <a:rPr kumimoji="0" lang="pt-BR" altLang="pt-BR" sz="3600" b="1" i="0" u="none" strike="noStrike" cap="none" normalizeH="0" baseline="0" dirty="0">
+                <a:ln>
+                  <a:noFill/>
+                </a:ln>
+                <a:solidFill>
+                  <a:schemeClr val="tx1">
+                    <a:lumMod val="95000"/>
+                  </a:schemeClr>
+                </a:solidFill>
+                <a:effectLst/>
+                <a:latin typeface="Arial" panose="020B0604020202020204" pitchFamily="34" charset="0"/>
+                <a:cs typeface="Arial" panose="020B0604020202020204" pitchFamily="34" charset="0"/>
+              </a:rPr>
+              <a:t>-ü]{3</a:t>
+            </a:r>
+            <a:r>
+              <a:rPr lang="pt-BR" altLang="pt-BR" sz="3600" b="1" dirty="0">
+                <a:solidFill>
+                  <a:schemeClr val="tx1">
+                    <a:lumMod val="95000"/>
+                  </a:schemeClr>
+                </a:solidFill>
+                <a:latin typeface="Arial" panose="020B0604020202020204" pitchFamily="34" charset="0"/>
+                <a:cs typeface="Arial" panose="020B0604020202020204" pitchFamily="34" charset="0"/>
+              </a:rPr>
+              <a:t>,}([</a:t>
+            </a:r>
+            <a:r>
+              <a:rPr kumimoji="0" lang="pt-BR" altLang="pt-BR" sz="3600" b="1" i="0" u="none" strike="noStrike" cap="none" normalizeH="0" baseline="0" dirty="0">
+                <a:ln>
+                  <a:noFill/>
+                </a:ln>
+                <a:solidFill>
+                  <a:schemeClr val="tx1">
+                    <a:lumMod val="95000"/>
+                  </a:schemeClr>
+                </a:solidFill>
+                <a:effectLst/>
+                <a:latin typeface="Arial" panose="020B0604020202020204" pitchFamily="34" charset="0"/>
+                <a:cs typeface="Arial" panose="020B0604020202020204" pitchFamily="34" charset="0"/>
+              </a:rPr>
+              <a:t> ]{1}[A-</a:t>
+            </a:r>
+            <a:r>
+              <a:rPr kumimoji="0" lang="pt-BR" altLang="pt-BR" sz="3600" b="1" i="0" u="none" strike="noStrike" cap="none" normalizeH="0" baseline="0" dirty="0" err="1">
+                <a:ln>
+                  <a:noFill/>
+                </a:ln>
+                <a:solidFill>
+                  <a:schemeClr val="tx1">
+                    <a:lumMod val="95000"/>
+                  </a:schemeClr>
+                </a:solidFill>
+                <a:effectLst/>
+                <a:latin typeface="Arial" panose="020B0604020202020204" pitchFamily="34" charset="0"/>
+                <a:cs typeface="Arial" panose="020B0604020202020204" pitchFamily="34" charset="0"/>
+              </a:rPr>
+              <a:t>zÀ</a:t>
+            </a:r>
+            <a:r>
+              <a:rPr kumimoji="0" lang="pt-BR" altLang="pt-BR" sz="3600" b="1" i="0" u="none" strike="noStrike" cap="none" normalizeH="0" baseline="0" dirty="0">
+                <a:ln>
+                  <a:noFill/>
+                </a:ln>
+                <a:solidFill>
+                  <a:schemeClr val="tx1">
+                    <a:lumMod val="95000"/>
+                  </a:schemeClr>
+                </a:solidFill>
+                <a:effectLst/>
+                <a:latin typeface="Arial" panose="020B0604020202020204" pitchFamily="34" charset="0"/>
+                <a:cs typeface="Arial" panose="020B0604020202020204" pitchFamily="34" charset="0"/>
+              </a:rPr>
+              <a:t>-ü]{2,})+$</a:t>
+            </a:r>
+            <a:endParaRPr lang="pt-BR" sz="3600" dirty="0">
+              <a:solidFill>
+                <a:schemeClr val="tx1">
+                  <a:lumMod val="95000"/>
+                </a:schemeClr>
+              </a:solidFill>
+            </a:endParaRPr>
+          </a:p>
+        </p:txBody>
+      </p:sp>
     </p:spTree>
     <p:extLst>
       <p:ext uri="{BB962C8B-B14F-4D97-AF65-F5344CB8AC3E}">
@@ -8067,7 +8225,7 @@
         </p:blipFill>
         <p:spPr>
           <a:xfrm>
-            <a:off x="8698154" y="1638300"/>
+            <a:off x="8698154" y="1638299"/>
             <a:ext cx="2779966" cy="1041400"/>
           </a:xfrm>
           <a:prstGeom prst="rect">
@@ -8464,7 +8622,7 @@
                 <a:latin typeface="Arial" panose="020B0604020202020204" pitchFamily="34" charset="0"/>
                 <a:cs typeface="Times New Roman" panose="02020603050405020304" pitchFamily="18" charset="0"/>
               </a:rPr>
-              <a:t>Podemos deixar o a estilização para um outro momento e focarmos na criação do arquivo </a:t>
+              <a:t>Podemos deixar  a estilização para um outro momento e focarmos na criação do arquivo </a:t>
             </a:r>
             <a:r>
               <a:rPr lang="pt-BR" sz="1400" b="1" kern="100" dirty="0">
@@ -8735,8 +8893,8 @@
         </p:nvSpPr>
         <p:spPr>
           <a:xfrm>
-            <a:off x="959006" y="724828"/>
-            <a:ext cx="8502494" cy="4621872"/>
+            <a:off x="959005" y="724827"/>
+            <a:ext cx="9152403" cy="5742233"/>
           </a:xfrm>
           <a:prstGeom prst="rect">
             <a:avLst/>
@@ -8744,7 +8902,7 @@
         </p:spPr>
         <p:txBody>
           <a:bodyPr vert="horz" lIns="91440" tIns="45720" rIns="91440" bIns="45720" rtlCol="0">
-            <a:normAutofit fontScale="77500" lnSpcReduction="20000"/>
+            <a:normAutofit fontScale="55000" lnSpcReduction="20000"/>
           </a:bodyPr>
           <a:lstStyle>
             <a:lvl1pPr marL="342900" indent="-342900" algn="l" defTabSz="457200" rtl="0" eaLnBrk="1" latinLnBrk="0" hangingPunct="1">
@@ -8979,23 +9137,19 @@
               <a:buNone/>
             </a:pPr>
             <a:r>
-              <a:rPr lang="pt-BR" sz="1400" kern="100" dirty="0">
+              <a:rPr lang="pt-BR" sz="2200" kern="100" dirty="0">
                 <a:latin typeface="Arial" panose="020B0604020202020204" pitchFamily="34" charset="0"/>
                 <a:cs typeface="Times New Roman" panose="02020603050405020304" pitchFamily="18" charset="0"/>
               </a:rPr>
               <a:t>REGEX – PRIMEIROS PASSOS PARA IMPLANTAÇÃO EM UM EXEMPLO PRÁTICO</a:t>
             </a:r>
-            <a:endParaRPr lang="pt-BR" sz="1800" kern="100" dirty="0">
-              <a:latin typeface="Arial" panose="020B0604020202020204" pitchFamily="34" charset="0"/>
-              <a:cs typeface="Times New Roman" panose="02020603050405020304" pitchFamily="18" charset="0"/>
-            </a:endParaRPr>
           </a:p>
           <a:p>
             <a:pPr marL="0" indent="0">
               <a:buFont typeface="Wingdings 3" charset="2"/>
               <a:buNone/>
             </a:pPr>
-            <a:endParaRPr lang="pt-BR" sz="1400" b="1" kern="100" dirty="0">
+            <a:endParaRPr lang="pt-BR" sz="2200" b="1" kern="100" dirty="0">
               <a:latin typeface="Arial" panose="020B0604020202020204" pitchFamily="34" charset="0"/>
               <a:cs typeface="Times New Roman" panose="02020603050405020304" pitchFamily="18" charset="0"/>
             </a:endParaRPr>
@@ -9018,7 +9172,7 @@
               <a:tabLst/>
             </a:pPr>
             <a:r>
-              <a:rPr kumimoji="0" lang="pt-BR" altLang="pt-BR" sz="1300" b="1" i="0" u="none" strike="noStrike" cap="none" normalizeH="0" baseline="0" dirty="0">
+              <a:rPr kumimoji="0" lang="pt-BR" altLang="pt-BR" sz="2200" b="1" i="0" u="none" strike="noStrike" cap="none" normalizeH="0" baseline="0" dirty="0">
                 <a:ln>
                   <a:noFill/>
                 </a:ln>
@@ -9032,7 +9186,7 @@
               <a:t>    </a:t>
             </a:r>
             <a:r>
-              <a:rPr kumimoji="0" lang="pt-BR" altLang="pt-BR" sz="1300" b="1" i="0" u="none" strike="noStrike" cap="none" normalizeH="0" baseline="0" dirty="0" err="1">
+              <a:rPr kumimoji="0" lang="pt-BR" altLang="pt-BR" sz="2200" b="1" i="0" u="none" strike="noStrike" cap="none" normalizeH="0" baseline="0" dirty="0" err="1">
                 <a:ln>
                   <a:noFill/>
                 </a:ln>
@@ -9046,7 +9200,7 @@
               <a:t>function</a:t>
             </a:r>
             <a:r>
-              <a:rPr kumimoji="0" lang="pt-BR" altLang="pt-BR" sz="1300" b="1" i="0" u="none" strike="noStrike" cap="none" normalizeH="0" baseline="0" dirty="0">
+              <a:rPr kumimoji="0" lang="pt-BR" altLang="pt-BR" sz="2200" b="1" i="0" u="none" strike="noStrike" cap="none" normalizeH="0" baseline="0" dirty="0">
                 <a:ln>
                   <a:noFill/>
                 </a:ln>
@@ -9060,7 +9214,7 @@
               <a:t> </a:t>
             </a:r>
             <a:r>
-              <a:rPr kumimoji="0" lang="pt-BR" altLang="pt-BR" sz="1300" b="1" i="0" u="none" strike="noStrike" cap="none" normalizeH="0" baseline="0" dirty="0" err="1">
+              <a:rPr kumimoji="0" lang="pt-BR" altLang="pt-BR" sz="2200" b="1" i="0" u="none" strike="noStrike" cap="none" normalizeH="0" baseline="0" dirty="0" err="1">
                 <a:ln>
                   <a:noFill/>
                 </a:ln>
@@ -9074,7 +9228,7 @@
               <a:t>validafrm</a:t>
             </a:r>
             <a:r>
-              <a:rPr kumimoji="0" lang="pt-BR" altLang="pt-BR" sz="1300" b="1" i="0" u="none" strike="noStrike" cap="none" normalizeH="0" baseline="0" dirty="0">
+              <a:rPr kumimoji="0" lang="pt-BR" altLang="pt-BR" sz="2200" b="1" i="0" u="none" strike="noStrike" cap="none" normalizeH="0" baseline="0" dirty="0">
                 <a:ln>
                   <a:noFill/>
                 </a:ln>
@@ -9088,7 +9242,7 @@
               <a:t>() { ... }: </a:t>
             </a:r>
             <a:r>
-              <a:rPr kumimoji="0" lang="pt-BR" altLang="pt-BR" sz="1300" b="0" i="0" u="none" strike="noStrike" cap="none" normalizeH="0" baseline="0" dirty="0">
+              <a:rPr kumimoji="0" lang="pt-BR" altLang="pt-BR" sz="2200" b="0" i="0" u="none" strike="noStrike" cap="none" normalizeH="0" baseline="0" dirty="0">
                 <a:ln>
                   <a:noFill/>
                 </a:ln>
@@ -9102,7 +9256,7 @@
               <a:t>define uma função chamada </a:t>
             </a:r>
             <a:r>
-              <a:rPr kumimoji="0" lang="pt-BR" altLang="pt-BR" sz="1300" b="1" i="0" u="none" strike="noStrike" cap="none" normalizeH="0" baseline="0" dirty="0" err="1">
+              <a:rPr kumimoji="0" lang="pt-BR" altLang="pt-BR" sz="2200" b="1" i="0" u="none" strike="noStrike" cap="none" normalizeH="0" baseline="0" dirty="0" err="1">
                 <a:ln>
                   <a:noFill/>
                 </a:ln>
@@ -9116,7 +9270,7 @@
               <a:t>validafrm</a:t>
             </a:r>
             <a:r>
-              <a:rPr kumimoji="0" lang="pt-BR" altLang="pt-BR" sz="1300" b="0" i="0" u="none" strike="noStrike" cap="none" normalizeH="0" baseline="0" dirty="0">
+              <a:rPr kumimoji="0" lang="pt-BR" altLang="pt-BR" sz="2200" b="0" i="0" u="none" strike="noStrike" cap="none" normalizeH="0" baseline="0" dirty="0">
                 <a:ln>
                   <a:noFill/>
                 </a:ln>
@@ -9148,7 +9302,7 @@
               <a:tabLst/>
             </a:pPr>
             <a:r>
-              <a:rPr kumimoji="0" lang="pt-BR" altLang="pt-BR" sz="1300" b="1" i="0" u="none" strike="noStrike" cap="none" normalizeH="0" baseline="0" dirty="0">
+              <a:rPr kumimoji="0" lang="pt-BR" altLang="pt-BR" sz="2200" b="1" i="0" u="none" strike="noStrike" cap="none" normalizeH="0" baseline="0" dirty="0">
                 <a:ln>
                   <a:noFill/>
                 </a:ln>
@@ -9162,7 +9316,7 @@
               <a:t>    var nome = document.form1.txtnome.value;: </a:t>
             </a:r>
             <a:r>
-              <a:rPr kumimoji="0" lang="pt-BR" altLang="pt-BR" sz="1300" b="0" i="0" u="none" strike="noStrike" cap="none" normalizeH="0" baseline="0" dirty="0">
+              <a:rPr kumimoji="0" lang="pt-BR" altLang="pt-BR" sz="2200" b="0" i="0" u="none" strike="noStrike" cap="none" normalizeH="0" baseline="0" dirty="0">
                 <a:ln>
                   <a:noFill/>
                 </a:ln>
@@ -9176,7 +9330,7 @@
               <a:t>pega o valor digitado no campo de texto chamado </a:t>
             </a:r>
             <a:r>
-              <a:rPr kumimoji="0" lang="pt-BR" altLang="pt-BR" sz="1300" b="0" i="0" u="none" strike="noStrike" cap="none" normalizeH="0" baseline="0" dirty="0" err="1">
+              <a:rPr kumimoji="0" lang="pt-BR" altLang="pt-BR" sz="2200" b="0" i="0" u="none" strike="noStrike" cap="none" normalizeH="0" baseline="0" dirty="0" err="1">
                 <a:ln>
                   <a:noFill/>
                 </a:ln>
@@ -9190,7 +9344,7 @@
               <a:t>txtnome</a:t>
             </a:r>
             <a:r>
-              <a:rPr kumimoji="0" lang="pt-BR" altLang="pt-BR" sz="1300" b="0" i="0" u="none" strike="noStrike" cap="none" normalizeH="0" baseline="0" dirty="0">
+              <a:rPr kumimoji="0" lang="pt-BR" altLang="pt-BR" sz="2200" b="0" i="0" u="none" strike="noStrike" cap="none" normalizeH="0" baseline="0" dirty="0">
                 <a:ln>
                   <a:noFill/>
                 </a:ln>
@@ -9205,7 +9359,7 @@
             </a:r>
           </a:p>
           <a:p>
-            <a:pPr marL="0" marR="0" lvl="0" indent="0" algn="just" defTabSz="914400" rtl="0" eaLnBrk="0" fontAlgn="base" latinLnBrk="0" hangingPunct="0">
+            <a:pPr marL="0" lvl="0" indent="0" algn="just" defTabSz="914400" eaLnBrk="0" fontAlgn="base" hangingPunct="0">
               <a:lnSpc>
                 <a:spcPct val="150000"/>
               </a:lnSpc>
@@ -9219,10 +9373,9 @@
               <a:buSzTx/>
               <a:buFontTx/>
               <a:buChar char="•"/>
-              <a:tabLst/>
             </a:pPr>
             <a:r>
-              <a:rPr lang="pt-BR" altLang="pt-BR" sz="1300" dirty="0">
+              <a:rPr lang="pt-BR" altLang="pt-BR" sz="2200" dirty="0">
                 <a:solidFill>
                   <a:srgbClr val="FFFF00"/>
                 </a:solidFill>
@@ -9232,7 +9385,7 @@
               <a:t>    </a:t>
             </a:r>
             <a:r>
-              <a:rPr kumimoji="0" lang="pt-BR" altLang="pt-BR" sz="1300" b="1" i="0" u="none" strike="noStrike" cap="none" normalizeH="0" baseline="0" dirty="0">
+              <a:rPr kumimoji="0" lang="pt-BR" altLang="pt-BR" sz="2200" b="1" i="0" u="none" strike="noStrike" cap="none" normalizeH="0" baseline="0" dirty="0">
                 <a:ln>
                   <a:noFill/>
                 </a:ln>
@@ -9246,7 +9399,7 @@
               <a:t>var </a:t>
             </a:r>
             <a:r>
-              <a:rPr kumimoji="0" lang="pt-BR" altLang="pt-BR" sz="1300" b="1" i="0" u="none" strike="noStrike" cap="none" normalizeH="0" baseline="0" dirty="0" err="1">
+              <a:rPr kumimoji="0" lang="pt-BR" altLang="pt-BR" sz="2200" b="1" i="0" u="none" strike="noStrike" cap="none" normalizeH="0" baseline="0" dirty="0" err="1">
                 <a:ln>
                   <a:noFill/>
                 </a:ln>
@@ -9260,7 +9413,7 @@
               <a:t>nomeRegex</a:t>
             </a:r>
             <a:r>
-              <a:rPr kumimoji="0" lang="pt-BR" altLang="pt-BR" sz="1300" b="1" i="0" u="none" strike="noStrike" cap="none" normalizeH="0" baseline="0" dirty="0">
+              <a:rPr kumimoji="0" lang="pt-BR" altLang="pt-BR" sz="2200" b="1" i="0" u="none" strike="noStrike" cap="none" normalizeH="0" baseline="0" dirty="0">
                 <a:ln>
                   <a:noFill/>
                 </a:ln>
@@ -9274,7 +9427,7 @@
               <a:t> = new </a:t>
             </a:r>
             <a:r>
-              <a:rPr kumimoji="0" lang="pt-BR" altLang="pt-BR" sz="1300" b="1" i="0" u="none" strike="noStrike" cap="none" normalizeH="0" baseline="0" dirty="0" err="1">
+              <a:rPr kumimoji="0" lang="pt-BR" altLang="pt-BR" sz="2200" b="1" i="0" u="none" strike="noStrike" cap="none" normalizeH="0" baseline="0" dirty="0" err="1">
                 <a:ln>
                   <a:noFill/>
                 </a:ln>
@@ -9288,7 +9441,7 @@
               <a:t>RegExp</a:t>
             </a:r>
             <a:r>
-              <a:rPr kumimoji="0" lang="pt-BR" altLang="pt-BR" sz="1300" b="1" i="0" u="none" strike="noStrike" cap="none" normalizeH="0" baseline="0" dirty="0">
+              <a:rPr kumimoji="0" lang="pt-BR" altLang="pt-BR" sz="2200" b="1" i="0" u="none" strike="noStrike" cap="none" normalizeH="0" baseline="0" dirty="0">
                 <a:ln>
                   <a:noFill/>
                 </a:ln>
@@ -9302,21 +9455,31 @@
               <a:t>("</a:t>
             </a:r>
             <a:r>
-              <a:rPr kumimoji="0" lang="pt-BR" altLang="pt-BR" sz="1300" b="1" i="0" u="none" strike="noStrike" cap="none" normalizeH="0" baseline="0" dirty="0">
+              <a:rPr lang="pt-BR" altLang="pt-BR" sz="2200" b="1" dirty="0">
+                <a:solidFill>
+                  <a:srgbClr val="FF0000"/>
+                </a:solidFill>
+                <a:latin typeface="Arial" panose="020B0604020202020204" pitchFamily="34" charset="0"/>
+                <a:cs typeface="Arial" panose="020B0604020202020204" pitchFamily="34" charset="0"/>
+              </a:rPr>
+              <a:t>^</a:t>
+            </a:r>
+            <a:r>
+              <a:rPr kumimoji="0" lang="pt-BR" altLang="pt-BR" sz="2200" b="1" i="0" u="none" strike="noStrike" cap="none" normalizeH="0" baseline="0" dirty="0">
                 <a:ln>
                   <a:noFill/>
                 </a:ln>
                 <a:solidFill>
-                  <a:srgbClr val="FF0000"/>
+                  <a:srgbClr val="FFFF00"/>
                 </a:solidFill>
                 <a:effectLst/>
                 <a:latin typeface="Arial" panose="020B0604020202020204" pitchFamily="34" charset="0"/>
                 <a:cs typeface="Arial" panose="020B0604020202020204" pitchFamily="34" charset="0"/>
               </a:rPr>
-              <a:t> </a:t>
-            </a:r>
-            <a:r>
-              <a:rPr kumimoji="0" lang="pt-BR" altLang="pt-BR" sz="1300" b="1" i="0" u="none" strike="noStrike" cap="none" normalizeH="0" baseline="0" dirty="0">
+              <a:t>[A-</a:t>
+            </a:r>
+            <a:r>
+              <a:rPr kumimoji="0" lang="pt-BR" altLang="pt-BR" sz="2200" b="1" i="0" u="none" strike="noStrike" cap="none" normalizeH="0" baseline="0" dirty="0" err="1">
                 <a:ln>
                   <a:noFill/>
                 </a:ln>
@@ -9327,20 +9490,10 @@
                 <a:latin typeface="Arial" panose="020B0604020202020204" pitchFamily="34" charset="0"/>
                 <a:cs typeface="Arial" panose="020B0604020202020204" pitchFamily="34" charset="0"/>
               </a:rPr>
-              <a:t>[</a:t>
-            </a:r>
-            <a:r>
-              <a:rPr lang="pt-BR" altLang="pt-BR" sz="1300" b="1" dirty="0">
-                <a:solidFill>
-                  <a:srgbClr val="FF0000"/>
-                </a:solidFill>
-                <a:latin typeface="Arial" panose="020B0604020202020204" pitchFamily="34" charset="0"/>
-                <a:cs typeface="Arial" panose="020B0604020202020204" pitchFamily="34" charset="0"/>
-              </a:rPr>
-              <a:t>^</a:t>
-            </a:r>
-            <a:r>
-              <a:rPr kumimoji="0" lang="pt-BR" altLang="pt-BR" sz="1300" b="1" i="0" u="none" strike="noStrike" cap="none" normalizeH="0" baseline="0" dirty="0">
+              <a:t>zÀ</a:t>
+            </a:r>
+            <a:r>
+              <a:rPr kumimoji="0" lang="pt-BR" altLang="pt-BR" sz="2200" b="1" i="0" u="none" strike="noStrike" cap="none" normalizeH="0" baseline="0" dirty="0">
                 <a:ln>
                   <a:noFill/>
                 </a:ln>
@@ -9351,62 +9504,34 @@
                 <a:latin typeface="Arial" panose="020B0604020202020204" pitchFamily="34" charset="0"/>
                 <a:cs typeface="Arial" panose="020B0604020202020204" pitchFamily="34" charset="0"/>
               </a:rPr>
-              <a:t>A-</a:t>
-            </a:r>
-            <a:r>
-              <a:rPr kumimoji="0" lang="pt-BR" altLang="pt-BR" sz="1300" b="1" i="0" u="none" strike="noStrike" cap="none" normalizeH="0" baseline="0" dirty="0" err="1">
+              <a:t>-ü]</a:t>
+            </a:r>
+            <a:r>
+              <a:rPr kumimoji="0" lang="pt-BR" altLang="pt-BR" sz="2200" b="1" i="0" u="none" strike="noStrike" cap="none" normalizeH="0" baseline="0" dirty="0">
                 <a:ln>
                   <a:noFill/>
                 </a:ln>
                 <a:solidFill>
-                  <a:srgbClr val="FFFF00"/>
+                  <a:srgbClr val="00B0F0"/>
                 </a:solidFill>
                 <a:effectLst/>
                 <a:latin typeface="Arial" panose="020B0604020202020204" pitchFamily="34" charset="0"/>
                 <a:cs typeface="Arial" panose="020B0604020202020204" pitchFamily="34" charset="0"/>
               </a:rPr>
-              <a:t>zÀ</a:t>
-            </a:r>
-            <a:r>
-              <a:rPr kumimoji="0" lang="pt-BR" altLang="pt-BR" sz="1300" b="1" i="0" u="none" strike="noStrike" cap="none" normalizeH="0" baseline="0" dirty="0">
-                <a:ln>
-                  <a:noFill/>
-                </a:ln>
-                <a:solidFill>
-                  <a:srgbClr val="FFFF00"/>
-                </a:solidFill>
-                <a:effectLst/>
+              <a:t>{3</a:t>
+            </a:r>
+            <a:r>
+              <a:rPr lang="pt-BR" altLang="pt-BR" sz="2200" b="1" dirty="0">
+                <a:solidFill>
+                  <a:srgbClr val="00B0F0"/>
+                </a:solidFill>
                 <a:latin typeface="Arial" panose="020B0604020202020204" pitchFamily="34" charset="0"/>
                 <a:cs typeface="Arial" panose="020B0604020202020204" pitchFamily="34" charset="0"/>
               </a:rPr>
-              <a:t>-ü]</a:t>
-            </a:r>
-            <a:r>
-              <a:rPr kumimoji="0" lang="pt-BR" altLang="pt-BR" sz="1300" b="1" i="0" u="none" strike="noStrike" cap="none" normalizeH="0" baseline="0" dirty="0">
-                <a:ln>
-                  <a:noFill/>
-                </a:ln>
-                <a:solidFill>
-                  <a:srgbClr val="00B0F0"/>
-                </a:solidFill>
-                <a:effectLst/>
-                <a:latin typeface="Arial" panose="020B0604020202020204" pitchFamily="34" charset="0"/>
-                <a:cs typeface="Arial" panose="020B0604020202020204" pitchFamily="34" charset="0"/>
-              </a:rPr>
-              <a:t>{3</a:t>
-            </a:r>
-            <a:r>
-              <a:rPr lang="pt-BR" altLang="pt-BR" sz="1300" b="1" dirty="0">
-                <a:solidFill>
-                  <a:srgbClr val="00B0F0"/>
-                </a:solidFill>
-                <a:latin typeface="Arial" panose="020B0604020202020204" pitchFamily="34" charset="0"/>
-                <a:cs typeface="Arial" panose="020B0604020202020204" pitchFamily="34" charset="0"/>
-              </a:rPr>
               <a:t>,}</a:t>
             </a:r>
             <a:r>
-              <a:rPr lang="pt-BR" altLang="pt-BR" sz="1300" b="1" dirty="0">
+              <a:rPr lang="pt-BR" altLang="pt-BR" sz="2200" b="1" dirty="0">
                 <a:solidFill>
                   <a:schemeClr val="bg2">
                     <a:lumMod val="60000"/>
@@ -9419,7 +9544,7 @@
               <a:t>(</a:t>
             </a:r>
             <a:r>
-              <a:rPr lang="pt-BR" altLang="pt-BR" sz="1300" b="1" dirty="0">
+              <a:rPr lang="pt-BR" altLang="pt-BR" sz="2200" b="1" dirty="0">
                 <a:solidFill>
                   <a:schemeClr val="tx2">
                     <a:lumMod val="10000"/>
@@ -9431,7 +9556,7 @@
               <a:t>[</a:t>
             </a:r>
             <a:r>
-              <a:rPr kumimoji="0" lang="pt-BR" altLang="pt-BR" sz="1300" b="1" i="0" u="none" strike="noStrike" cap="none" normalizeH="0" baseline="0" dirty="0">
+              <a:rPr kumimoji="0" lang="pt-BR" altLang="pt-BR" sz="2200" b="1" i="0" u="none" strike="noStrike" cap="none" normalizeH="0" baseline="0" dirty="0">
                 <a:ln>
                   <a:noFill/>
                 </a:ln>
@@ -9447,7 +9572,7 @@
               <a:t> ]{1}</a:t>
             </a:r>
             <a:r>
-              <a:rPr kumimoji="0" lang="pt-BR" altLang="pt-BR" sz="1300" b="1" i="0" u="none" strike="noStrike" cap="none" normalizeH="0" baseline="0" dirty="0">
+              <a:rPr kumimoji="0" lang="pt-BR" altLang="pt-BR" sz="2200" b="1" i="0" u="none" strike="noStrike" cap="none" normalizeH="0" baseline="0" dirty="0">
                 <a:ln>
                   <a:noFill/>
                 </a:ln>
@@ -9464,7 +9589,7 @@
               <a:t>[A-</a:t>
             </a:r>
             <a:r>
-              <a:rPr kumimoji="0" lang="pt-BR" altLang="pt-BR" sz="1300" b="1" i="0" u="none" strike="noStrike" cap="none" normalizeH="0" baseline="0" dirty="0" err="1">
+              <a:rPr kumimoji="0" lang="pt-BR" altLang="pt-BR" sz="2200" b="1" i="0" u="none" strike="noStrike" cap="none" normalizeH="0" baseline="0" dirty="0" err="1">
                 <a:ln>
                   <a:noFill/>
                 </a:ln>
@@ -9481,7 +9606,7 @@
               <a:t>zÀ</a:t>
             </a:r>
             <a:r>
-              <a:rPr kumimoji="0" lang="pt-BR" altLang="pt-BR" sz="1300" b="1" i="0" u="none" strike="noStrike" cap="none" normalizeH="0" baseline="0" dirty="0">
+              <a:rPr kumimoji="0" lang="pt-BR" altLang="pt-BR" sz="2200" b="1" i="0" u="none" strike="noStrike" cap="none" normalizeH="0" baseline="0" dirty="0">
                 <a:ln>
                   <a:noFill/>
                 </a:ln>
@@ -9498,7 +9623,7 @@
               <a:t>-ü]</a:t>
             </a:r>
             <a:r>
-              <a:rPr kumimoji="0" lang="pt-BR" altLang="pt-BR" sz="1300" b="1" i="0" u="none" strike="noStrike" cap="none" normalizeH="0" baseline="0" dirty="0">
+              <a:rPr kumimoji="0" lang="pt-BR" altLang="pt-BR" sz="2200" b="1" i="0" u="none" strike="noStrike" cap="none" normalizeH="0" baseline="0" dirty="0">
                 <a:ln>
                   <a:noFill/>
                 </a:ln>
@@ -9512,7 +9637,7 @@
               <a:t>{2,}</a:t>
             </a:r>
             <a:r>
-              <a:rPr kumimoji="0" lang="pt-BR" altLang="pt-BR" sz="1300" b="1" i="0" u="none" strike="noStrike" cap="none" normalizeH="0" baseline="0" dirty="0">
+              <a:rPr kumimoji="0" lang="pt-BR" altLang="pt-BR" sz="2200" b="1" i="0" u="none" strike="noStrike" cap="none" normalizeH="0" baseline="0" dirty="0">
                 <a:ln>
                   <a:noFill/>
                 </a:ln>
@@ -9529,7 +9654,7 @@
               <a:t>)</a:t>
             </a:r>
             <a:r>
-              <a:rPr kumimoji="0" lang="pt-BR" altLang="pt-BR" sz="1300" b="1" i="0" u="none" strike="noStrike" cap="none" normalizeH="0" baseline="0" dirty="0">
+              <a:rPr kumimoji="0" lang="pt-BR" altLang="pt-BR" sz="2200" b="1" i="0" u="none" strike="noStrike" cap="none" normalizeH="0" baseline="0" dirty="0">
                 <a:ln>
                   <a:noFill/>
                 </a:ln>
@@ -9543,7 +9668,7 @@
               <a:t>+</a:t>
             </a:r>
             <a:r>
-              <a:rPr kumimoji="0" lang="pt-BR" altLang="pt-BR" sz="1300" b="1" i="0" u="none" strike="noStrike" cap="none" normalizeH="0" baseline="0" dirty="0">
+              <a:rPr kumimoji="0" lang="pt-BR" altLang="pt-BR" sz="2200" b="1" i="0" u="none" strike="noStrike" cap="none" normalizeH="0" baseline="0" dirty="0">
                 <a:ln>
                   <a:noFill/>
                 </a:ln>
@@ -9557,7 +9682,7 @@
               <a:t>$</a:t>
             </a:r>
             <a:r>
-              <a:rPr kumimoji="0" lang="pt-BR" altLang="pt-BR" sz="1300" b="1" i="0" u="none" strike="noStrike" cap="none" normalizeH="0" baseline="0" dirty="0">
+              <a:rPr kumimoji="0" lang="pt-BR" altLang="pt-BR" sz="2200" b="1" i="0" u="none" strike="noStrike" cap="none" normalizeH="0" baseline="0" dirty="0">
                 <a:ln>
                   <a:noFill/>
                 </a:ln>
@@ -9571,7 +9696,7 @@
               <a:t>");:</a:t>
             </a:r>
             <a:r>
-              <a:rPr kumimoji="0" lang="pt-BR" altLang="pt-BR" sz="1300" b="0" i="0" u="none" strike="noStrike" cap="none" normalizeH="0" baseline="0" dirty="0">
+              <a:rPr kumimoji="0" lang="pt-BR" altLang="pt-BR" sz="2200" b="0" i="0" u="none" strike="noStrike" cap="none" normalizeH="0" baseline="0" dirty="0">
                 <a:ln>
                   <a:noFill/>
                 </a:ln>
@@ -9584,7 +9709,7 @@
               </a:rPr>
               <a:t> cria uma expressão regular que verifica se o nome:</a:t>
             </a:r>
-            <a:endParaRPr kumimoji="0" lang="pt-BR" altLang="pt-BR" sz="1800" b="0" i="0" u="none" strike="noStrike" cap="none" normalizeH="0" baseline="0" dirty="0">
+            <a:endParaRPr kumimoji="0" lang="pt-BR" altLang="pt-BR" sz="2200" b="0" i="0" u="none" strike="noStrike" cap="none" normalizeH="0" baseline="0" dirty="0">
               <a:ln>
                 <a:noFill/>
               </a:ln>
@@ -9613,7 +9738,7 @@
               <a:tabLst/>
             </a:pPr>
             <a:r>
-              <a:rPr kumimoji="0" lang="pt-BR" altLang="pt-BR" sz="1300" b="1" i="0" u="none" strike="noStrike" cap="none" normalizeH="0" baseline="0" dirty="0">
+              <a:rPr kumimoji="0" lang="pt-BR" altLang="pt-BR" sz="2200" b="1" i="0" u="none" strike="noStrike" cap="none" normalizeH="0" baseline="0" dirty="0">
                 <a:ln>
                   <a:noFill/>
                 </a:ln>
@@ -9626,7 +9751,7 @@
               </a:rPr>
               <a:t>^</a:t>
             </a:r>
-            <a:endParaRPr kumimoji="0" lang="pt-BR" altLang="pt-BR" sz="1300" b="0" i="0" u="none" strike="noStrike" cap="none" normalizeH="0" baseline="0" dirty="0">
+            <a:endParaRPr kumimoji="0" lang="pt-BR" altLang="pt-BR" sz="2200" b="0" i="0" u="none" strike="noStrike" cap="none" normalizeH="0" baseline="0" dirty="0">
               <a:ln>
                 <a:noFill/>
               </a:ln>
@@ -9656,7 +9781,7 @@
               <a:tabLst/>
             </a:pPr>
             <a:r>
-              <a:rPr kumimoji="0" lang="pt-BR" altLang="pt-BR" sz="1300" b="0" i="0" u="none" strike="noStrike" cap="none" normalizeH="0" baseline="0" dirty="0">
+              <a:rPr kumimoji="0" lang="pt-BR" altLang="pt-BR" sz="2200" b="0" i="0" u="none" strike="noStrike" cap="none" normalizeH="0" baseline="0" dirty="0">
                 <a:ln>
                   <a:noFill/>
                 </a:ln>
@@ -9670,7 +9795,7 @@
               <a:t>Indica o início da </a:t>
             </a:r>
             <a:r>
-              <a:rPr kumimoji="0" lang="pt-BR" altLang="pt-BR" sz="1300" b="0" i="0" u="none" strike="noStrike" cap="none" normalizeH="0" baseline="0" dirty="0" err="1">
+              <a:rPr kumimoji="0" lang="pt-BR" altLang="pt-BR" sz="2200" b="0" i="0" u="none" strike="noStrike" cap="none" normalizeH="0" baseline="0" dirty="0" err="1">
                 <a:ln>
                   <a:noFill/>
                 </a:ln>
@@ -9684,7 +9809,7 @@
               <a:t>string</a:t>
             </a:r>
             <a:r>
-              <a:rPr kumimoji="0" lang="pt-BR" altLang="pt-BR" sz="1300" b="0" i="0" u="none" strike="noStrike" cap="none" normalizeH="0" baseline="0" dirty="0">
+              <a:rPr kumimoji="0" lang="pt-BR" altLang="pt-BR" sz="2200" b="0" i="0" u="none" strike="noStrike" cap="none" normalizeH="0" baseline="0" dirty="0">
                 <a:ln>
                   <a:noFill/>
                 </a:ln>
@@ -9716,7 +9841,7 @@
               <a:tabLst/>
             </a:pPr>
             <a:r>
-              <a:rPr kumimoji="0" lang="pt-BR" altLang="pt-BR" sz="1300" b="1" i="0" u="none" strike="noStrike" cap="none" normalizeH="0" baseline="0" dirty="0">
+              <a:rPr kumimoji="0" lang="pt-BR" altLang="pt-BR" sz="2200" b="1" i="0" u="none" strike="noStrike" cap="none" normalizeH="0" baseline="0" dirty="0">
                 <a:ln>
                   <a:noFill/>
                 </a:ln>
@@ -9730,7 +9855,7 @@
               <a:t>[A-</a:t>
             </a:r>
             <a:r>
-              <a:rPr kumimoji="0" lang="pt-BR" altLang="pt-BR" sz="1300" b="1" i="0" u="none" strike="noStrike" cap="none" normalizeH="0" baseline="0" dirty="0" err="1">
+              <a:rPr kumimoji="0" lang="pt-BR" altLang="pt-BR" sz="2200" b="1" i="0" u="none" strike="noStrike" cap="none" normalizeH="0" baseline="0" dirty="0" err="1">
                 <a:ln>
                   <a:noFill/>
                 </a:ln>
@@ -9744,7 +9869,7 @@
               <a:t>zÀ</a:t>
             </a:r>
             <a:r>
-              <a:rPr kumimoji="0" lang="pt-BR" altLang="pt-BR" sz="1300" b="1" i="0" u="none" strike="noStrike" cap="none" normalizeH="0" baseline="0" dirty="0">
+              <a:rPr kumimoji="0" lang="pt-BR" altLang="pt-BR" sz="2200" b="1" i="0" u="none" strike="noStrike" cap="none" normalizeH="0" baseline="0" dirty="0">
                 <a:ln>
                   <a:noFill/>
                 </a:ln>
@@ -9758,7 +9883,7 @@
               <a:t>-ü]</a:t>
             </a:r>
             <a:r>
-              <a:rPr kumimoji="0" lang="pt-BR" altLang="pt-BR" sz="1300" b="1" i="0" u="none" strike="noStrike" cap="none" normalizeH="0" baseline="0" dirty="0">
+              <a:rPr kumimoji="0" lang="pt-BR" altLang="pt-BR" sz="2200" b="1" i="0" u="none" strike="noStrike" cap="none" normalizeH="0" baseline="0" dirty="0">
                 <a:ln>
                   <a:noFill/>
                 </a:ln>
@@ -9771,7 +9896,7 @@
               </a:rPr>
               <a:t>{3,}</a:t>
             </a:r>
-            <a:endParaRPr kumimoji="0" lang="pt-BR" altLang="pt-BR" sz="1300" b="0" i="0" u="none" strike="noStrike" cap="none" normalizeH="0" baseline="0" dirty="0">
+            <a:endParaRPr kumimoji="0" lang="pt-BR" altLang="pt-BR" sz="2200" b="0" i="0" u="none" strike="noStrike" cap="none" normalizeH="0" baseline="0" dirty="0">
               <a:ln>
                 <a:noFill/>
               </a:ln>
@@ -9801,7 +9926,7 @@
               <a:tabLst/>
             </a:pPr>
             <a:r>
-              <a:rPr kumimoji="0" lang="pt-BR" altLang="pt-BR" sz="1300" b="0" i="0" u="none" strike="noStrike" cap="none" normalizeH="0" baseline="0" dirty="0">
+              <a:rPr kumimoji="0" lang="pt-BR" altLang="pt-BR" sz="2200" b="0" i="0" u="none" strike="noStrike" cap="none" normalizeH="0" baseline="0" dirty="0">
                 <a:ln>
                   <a:noFill/>
                 </a:ln>
@@ -9815,7 +9940,7 @@
               <a:t>[A-</a:t>
             </a:r>
             <a:r>
-              <a:rPr kumimoji="0" lang="pt-BR" altLang="pt-BR" sz="1300" b="0" i="0" u="none" strike="noStrike" cap="none" normalizeH="0" baseline="0" dirty="0" err="1">
+              <a:rPr kumimoji="0" lang="pt-BR" altLang="pt-BR" sz="2200" b="0" i="0" u="none" strike="noStrike" cap="none" normalizeH="0" baseline="0" dirty="0" err="1">
                 <a:ln>
                   <a:noFill/>
                 </a:ln>
@@ -9829,7 +9954,7 @@
               <a:t>zÀ</a:t>
             </a:r>
             <a:r>
-              <a:rPr kumimoji="0" lang="pt-BR" altLang="pt-BR" sz="1300" b="0" i="0" u="none" strike="noStrike" cap="none" normalizeH="0" baseline="0" dirty="0">
+              <a:rPr kumimoji="0" lang="pt-BR" altLang="pt-BR" sz="2200" b="0" i="0" u="none" strike="noStrike" cap="none" normalizeH="0" baseline="0" dirty="0">
                 <a:ln>
                   <a:noFill/>
                 </a:ln>
@@ -9843,7 +9968,7 @@
               <a:t>-ü]: </a:t>
             </a:r>
             <a:r>
-              <a:rPr kumimoji="0" lang="pt-BR" altLang="pt-BR" sz="1300" b="0" i="0" u="none" strike="noStrike" cap="none" normalizeH="0" baseline="0" dirty="0">
+              <a:rPr kumimoji="0" lang="pt-BR" altLang="pt-BR" sz="2200" b="0" i="0" u="none" strike="noStrike" cap="none" normalizeH="0" baseline="0" dirty="0">
                 <a:ln>
                   <a:noFill/>
                 </a:ln>
@@ -9857,7 +9982,7 @@
               <a:t>conjunto de caracteres permitidos, ou seja, qualquer letra maiúscula ou minúscula do alfabeto inglês (</a:t>
             </a:r>
             <a:r>
-              <a:rPr kumimoji="0" lang="pt-BR" altLang="pt-BR" sz="1300" b="0" i="0" u="none" strike="noStrike" cap="none" normalizeH="0" baseline="0" dirty="0" err="1">
+              <a:rPr kumimoji="0" lang="pt-BR" altLang="pt-BR" sz="2200" b="0" i="0" u="none" strike="noStrike" cap="none" normalizeH="0" baseline="0" dirty="0" err="1">
                 <a:ln>
                   <a:noFill/>
                 </a:ln>
@@ -9871,7 +9996,7 @@
               <a:t>A-z</a:t>
             </a:r>
             <a:r>
-              <a:rPr kumimoji="0" lang="pt-BR" altLang="pt-BR" sz="1300" b="0" i="0" u="none" strike="noStrike" cap="none" normalizeH="0" baseline="0" dirty="0">
+              <a:rPr kumimoji="0" lang="pt-BR" altLang="pt-BR" sz="2200" b="0" i="0" u="none" strike="noStrike" cap="none" normalizeH="0" baseline="0" dirty="0">
                 <a:ln>
                   <a:noFill/>
                 </a:ln>
@@ -9885,7 +10010,7 @@
               <a:t>) e letras acentuadas do intervalo À até ü (inclui letras com acentos, como á, é, í, ó, ú, ç, </a:t>
             </a:r>
             <a:r>
-              <a:rPr kumimoji="0" lang="pt-BR" altLang="pt-BR" sz="1300" b="0" i="0" u="none" strike="noStrike" cap="none" normalizeH="0" baseline="0" dirty="0" err="1">
+              <a:rPr kumimoji="0" lang="pt-BR" altLang="pt-BR" sz="2200" b="0" i="0" u="none" strike="noStrike" cap="none" normalizeH="0" baseline="0" dirty="0" err="1">
                 <a:ln>
                   <a:noFill/>
                 </a:ln>
@@ -9899,7 +10024,7 @@
               <a:t>etc</a:t>
             </a:r>
             <a:r>
-              <a:rPr kumimoji="0" lang="pt-BR" altLang="pt-BR" sz="1300" b="0" i="0" u="none" strike="noStrike" cap="none" normalizeH="0" baseline="0" dirty="0">
+              <a:rPr kumimoji="0" lang="pt-BR" altLang="pt-BR" sz="2200" b="0" i="0" u="none" strike="noStrike" cap="none" normalizeH="0" baseline="0" dirty="0">
                 <a:ln>
                   <a:noFill/>
                 </a:ln>
@@ -9931,7 +10056,7 @@
               <a:tabLst/>
             </a:pPr>
             <a:r>
-              <a:rPr kumimoji="0" lang="pt-BR" altLang="pt-BR" sz="1300" b="1" i="0" u="none" strike="noStrike" cap="none" normalizeH="0" baseline="0" dirty="0">
+              <a:rPr kumimoji="0" lang="pt-BR" altLang="pt-BR" sz="2200" b="1" i="0" u="none" strike="noStrike" cap="none" normalizeH="0" baseline="0" dirty="0">
                 <a:ln>
                   <a:noFill/>
                 </a:ln>
@@ -9945,7 +10070,7 @@
               <a:t>{3,} </a:t>
             </a:r>
             <a:r>
-              <a:rPr kumimoji="0" lang="pt-BR" altLang="pt-BR" sz="1300" b="1" i="0" u="none" strike="noStrike" cap="none" normalizeH="0" baseline="0" dirty="0">
+              <a:rPr kumimoji="0" lang="pt-BR" altLang="pt-BR" sz="2200" b="1" i="0" u="none" strike="noStrike" cap="none" normalizeH="0" baseline="0" dirty="0">
                 <a:ln>
                   <a:noFill/>
                 </a:ln>
@@ -9956,7 +10081,7 @@
               <a:t>I</a:t>
             </a:r>
             <a:r>
-              <a:rPr kumimoji="0" lang="pt-BR" altLang="pt-BR" sz="1300" b="0" i="0" u="none" strike="noStrike" cap="none" normalizeH="0" baseline="0" dirty="0">
+              <a:rPr kumimoji="0" lang="pt-BR" altLang="pt-BR" sz="2200" b="0" i="0" u="none" strike="noStrike" cap="none" normalizeH="0" baseline="0" dirty="0">
                 <a:ln>
                   <a:noFill/>
                 </a:ln>
@@ -9970,7 +10095,7 @@
               <a:t>ndica que deve haver </a:t>
             </a:r>
             <a:r>
-              <a:rPr kumimoji="0" lang="pt-BR" altLang="pt-BR" sz="1300" b="1" i="0" u="none" strike="noStrike" cap="none" normalizeH="0" baseline="0" dirty="0">
+              <a:rPr kumimoji="0" lang="pt-BR" altLang="pt-BR" sz="2200" b="1" i="0" u="none" strike="noStrike" cap="none" normalizeH="0" baseline="0" dirty="0">
                 <a:ln>
                   <a:noFill/>
                 </a:ln>
@@ -9984,7 +10109,7 @@
               <a:t>pelo menos 3 caracteres</a:t>
             </a:r>
             <a:r>
-              <a:rPr kumimoji="0" lang="pt-BR" altLang="pt-BR" sz="1300" b="0" i="0" u="none" strike="noStrike" cap="none" normalizeH="0" baseline="0" dirty="0">
+              <a:rPr kumimoji="0" lang="pt-BR" altLang="pt-BR" sz="2200" b="0" i="0" u="none" strike="noStrike" cap="none" normalizeH="0" baseline="0" dirty="0">
                 <a:ln>
                   <a:noFill/>
                 </a:ln>
@@ -10016,7 +10141,7 @@
               <a:tabLst/>
             </a:pPr>
             <a:r>
-              <a:rPr kumimoji="0" lang="pt-BR" altLang="pt-BR" sz="1300" b="0" i="0" u="none" strike="noStrike" cap="none" normalizeH="0" baseline="0" dirty="0">
+              <a:rPr kumimoji="0" lang="pt-BR" altLang="pt-BR" sz="2200" b="0" i="0" u="none" strike="noStrike" cap="none" normalizeH="0" baseline="0" dirty="0">
                 <a:ln>
                   <a:noFill/>
                 </a:ln>
@@ -10048,7 +10173,7 @@
               <a:tabLst/>
             </a:pPr>
             <a:r>
-              <a:rPr kumimoji="0" lang="pt-BR" altLang="pt-BR" sz="1300" b="1" i="0" u="none" strike="noStrike" cap="none" normalizeH="0" baseline="0" dirty="0">
+              <a:rPr kumimoji="0" lang="pt-BR" altLang="pt-BR" sz="2200" b="1" i="0" u="none" strike="noStrike" cap="none" normalizeH="0" baseline="0" dirty="0">
                 <a:ln>
                   <a:noFill/>
                 </a:ln>
@@ -10065,7 +10190,7 @@
               <a:t>([ ]{1}[A-</a:t>
             </a:r>
             <a:r>
-              <a:rPr kumimoji="0" lang="pt-BR" altLang="pt-BR" sz="1300" b="1" i="0" u="none" strike="noStrike" cap="none" normalizeH="0" baseline="0" dirty="0" err="1">
+              <a:rPr kumimoji="0" lang="pt-BR" altLang="pt-BR" sz="2200" b="1" i="0" u="none" strike="noStrike" cap="none" normalizeH="0" baseline="0" dirty="0" err="1">
                 <a:ln>
                   <a:noFill/>
                 </a:ln>
@@ -10082,7 +10207,7 @@
               <a:t>zÀ</a:t>
             </a:r>
             <a:r>
-              <a:rPr kumimoji="0" lang="pt-BR" altLang="pt-BR" sz="1300" b="1" i="0" u="none" strike="noStrike" cap="none" normalizeH="0" baseline="0" dirty="0">
+              <a:rPr kumimoji="0" lang="pt-BR" altLang="pt-BR" sz="2200" b="1" i="0" u="none" strike="noStrike" cap="none" normalizeH="0" baseline="0" dirty="0">
                 <a:ln>
                   <a:noFill/>
                 </a:ln>
@@ -10098,7 +10223,7 @@
               </a:rPr>
               <a:t>-ü]{2,})+</a:t>
             </a:r>
-            <a:endParaRPr kumimoji="0" lang="pt-BR" altLang="pt-BR" sz="1300" b="0" i="0" u="none" strike="noStrike" cap="none" normalizeH="0" baseline="0" dirty="0">
+            <a:endParaRPr kumimoji="0" lang="pt-BR" altLang="pt-BR" sz="2200" b="0" i="0" u="none" strike="noStrike" cap="none" normalizeH="0" baseline="0" dirty="0">
               <a:ln>
                 <a:noFill/>
               </a:ln>
@@ -10131,7 +10256,7 @@
               <a:tabLst/>
             </a:pPr>
             <a:r>
-              <a:rPr kumimoji="0" lang="pt-BR" altLang="pt-BR" sz="1300" b="1" i="0" u="none" strike="noStrike" cap="none" normalizeH="0" baseline="0" dirty="0">
+              <a:rPr kumimoji="0" lang="pt-BR" altLang="pt-BR" sz="2200" b="1" i="0" u="none" strike="noStrike" cap="none" normalizeH="0" baseline="0" dirty="0">
                 <a:ln>
                   <a:noFill/>
                 </a:ln>
@@ -10148,7 +10273,7 @@
               <a:t>([ ]{1}[A-</a:t>
             </a:r>
             <a:r>
-              <a:rPr kumimoji="0" lang="pt-BR" altLang="pt-BR" sz="1300" b="1" i="0" u="none" strike="noStrike" cap="none" normalizeH="0" baseline="0" dirty="0" err="1">
+              <a:rPr kumimoji="0" lang="pt-BR" altLang="pt-BR" sz="2200" b="1" i="0" u="none" strike="noStrike" cap="none" normalizeH="0" baseline="0" dirty="0" err="1">
                 <a:ln>
                   <a:noFill/>
                 </a:ln>
@@ -10165,7 +10290,7 @@
               <a:t>zÀ</a:t>
             </a:r>
             <a:r>
-              <a:rPr kumimoji="0" lang="pt-BR" altLang="pt-BR" sz="1300" b="1" i="0" u="none" strike="noStrike" cap="none" normalizeH="0" baseline="0" dirty="0">
+              <a:rPr kumimoji="0" lang="pt-BR" altLang="pt-BR" sz="2200" b="1" i="0" u="none" strike="noStrike" cap="none" normalizeH="0" baseline="0" dirty="0">
                 <a:ln>
                   <a:noFill/>
                 </a:ln>
@@ -10182,7 +10307,7 @@
               <a:t>-ü]{2,}):</a:t>
             </a:r>
             <a:r>
-              <a:rPr kumimoji="0" lang="pt-BR" altLang="pt-BR" sz="1300" b="0" i="0" u="none" strike="noStrike" cap="none" normalizeH="0" baseline="0" dirty="0">
+              <a:rPr kumimoji="0" lang="pt-BR" altLang="pt-BR" sz="2200" b="0" i="0" u="none" strike="noStrike" cap="none" normalizeH="0" baseline="0" dirty="0">
                 <a:ln>
                   <a:noFill/>
                 </a:ln>
@@ -10199,7 +10324,7 @@
               <a:t> </a:t>
             </a:r>
             <a:r>
-              <a:rPr kumimoji="0" lang="pt-BR" altLang="pt-BR" sz="1300" b="0" i="0" u="none" strike="noStrike" cap="none" normalizeH="0" baseline="0" dirty="0">
+              <a:rPr kumimoji="0" lang="pt-BR" altLang="pt-BR" sz="2200" b="0" i="0" u="none" strike="noStrike" cap="none" normalizeH="0" baseline="0" dirty="0">
                 <a:ln>
                   <a:noFill/>
                 </a:ln>
@@ -10231,7 +10356,7 @@
               <a:tabLst/>
             </a:pPr>
             <a:r>
-              <a:rPr kumimoji="0" lang="pt-BR" altLang="pt-BR" sz="1300" b="1" i="0" u="none" strike="noStrike" cap="none" normalizeH="0" baseline="0" dirty="0">
+              <a:rPr kumimoji="0" lang="pt-BR" altLang="pt-BR" sz="2200" b="1" i="0" u="none" strike="noStrike" cap="none" normalizeH="0" baseline="0" dirty="0">
                 <a:ln>
                   <a:noFill/>
                 </a:ln>
@@ -10247,7 +10372,7 @@
               <a:t>[ ]{1}: </a:t>
             </a:r>
             <a:r>
-              <a:rPr kumimoji="0" lang="pt-BR" altLang="pt-BR" sz="1300" b="0" i="0" u="none" strike="noStrike" cap="none" normalizeH="0" baseline="0" dirty="0">
+              <a:rPr kumimoji="0" lang="pt-BR" altLang="pt-BR" sz="2200" b="0" i="0" u="none" strike="noStrike" cap="none" normalizeH="0" baseline="0" dirty="0">
                 <a:ln>
                   <a:noFill/>
                 </a:ln>
@@ -10279,7 +10404,7 @@
               <a:tabLst/>
             </a:pPr>
             <a:r>
-              <a:rPr kumimoji="0" lang="pt-BR" altLang="pt-BR" sz="1300" b="0" i="0" u="none" strike="noStrike" cap="none" normalizeH="0" baseline="0" dirty="0">
+              <a:rPr kumimoji="0" lang="pt-BR" altLang="pt-BR" sz="2200" b="0" i="0" u="none" strike="noStrike" cap="none" normalizeH="0" baseline="0" dirty="0">
                 <a:ln>
                   <a:noFill/>
                 </a:ln>
@@ -10293,7 +10418,7 @@
               <a:t>[A-</a:t>
             </a:r>
             <a:r>
-              <a:rPr kumimoji="0" lang="pt-BR" altLang="pt-BR" sz="1300" b="0" i="0" u="none" strike="noStrike" cap="none" normalizeH="0" baseline="0" dirty="0" err="1">
+              <a:rPr kumimoji="0" lang="pt-BR" altLang="pt-BR" sz="2200" b="0" i="0" u="none" strike="noStrike" cap="none" normalizeH="0" baseline="0" dirty="0" err="1">
                 <a:ln>
                   <a:noFill/>
                 </a:ln>
@@ -10307,7 +10432,7 @@
               <a:t>zÀ</a:t>
             </a:r>
             <a:r>
-              <a:rPr kumimoji="0" lang="pt-BR" altLang="pt-BR" sz="1300" b="0" i="0" u="none" strike="noStrike" cap="none" normalizeH="0" baseline="0" dirty="0">
+              <a:rPr kumimoji="0" lang="pt-BR" altLang="pt-BR" sz="2200" b="0" i="0" u="none" strike="noStrike" cap="none" normalizeH="0" baseline="0" dirty="0">
                 <a:ln>
                   <a:noFill/>
                 </a:ln>
@@ -10321,7 +10446,7 @@
               <a:t>-ü]{2,}</a:t>
             </a:r>
             <a:r>
-              <a:rPr kumimoji="0" lang="pt-BR" altLang="pt-BR" sz="1300" b="0" i="0" u="none" strike="noStrike" cap="none" normalizeH="0" baseline="0" dirty="0">
+              <a:rPr kumimoji="0" lang="pt-BR" altLang="pt-BR" sz="2200" b="0" i="0" u="none" strike="noStrike" cap="none" normalizeH="0" baseline="0" dirty="0">
                 <a:ln>
                   <a:noFill/>
                 </a:ln>
@@ -10353,7 +10478,7 @@
               <a:tabLst/>
             </a:pPr>
             <a:r>
-              <a:rPr kumimoji="0" lang="pt-BR" altLang="pt-BR" sz="1300" b="0" i="0" u="none" strike="noStrike" cap="none" normalizeH="0" baseline="0" dirty="0">
+              <a:rPr kumimoji="0" lang="pt-BR" altLang="pt-BR" sz="2200" b="0" i="0" u="none" strike="noStrike" cap="none" normalizeH="0" baseline="0" dirty="0">
                 <a:ln>
                   <a:noFill/>
                 </a:ln>
@@ -10385,7 +10510,7 @@
               <a:tabLst/>
             </a:pPr>
             <a:r>
-              <a:rPr kumimoji="0" lang="pt-BR" altLang="pt-BR" sz="1300" b="0" i="0" u="none" strike="noStrike" cap="none" normalizeH="0" baseline="0" dirty="0">
+              <a:rPr kumimoji="0" lang="pt-BR" altLang="pt-BR" sz="2200" b="0" i="0" u="none" strike="noStrike" cap="none" normalizeH="0" baseline="0" dirty="0">
                 <a:ln>
                   <a:noFill/>
                 </a:ln>
@@ -10399,7 +10524,7 @@
               <a:t>O </a:t>
             </a:r>
             <a:r>
-              <a:rPr kumimoji="0" lang="pt-BR" altLang="pt-BR" sz="1300" b="1" i="0" u="none" strike="noStrike" cap="none" normalizeH="0" baseline="0" dirty="0">
+              <a:rPr kumimoji="0" lang="pt-BR" altLang="pt-BR" sz="2200" b="1" i="0" u="none" strike="noStrike" cap="none" normalizeH="0" baseline="0" dirty="0">
                 <a:ln>
                   <a:noFill/>
                 </a:ln>
@@ -10413,7 +10538,7 @@
               <a:t>+</a:t>
             </a:r>
             <a:r>
-              <a:rPr kumimoji="0" lang="pt-BR" altLang="pt-BR" sz="1300" b="0" i="0" u="none" strike="noStrike" cap="none" normalizeH="0" baseline="0" dirty="0">
+              <a:rPr kumimoji="0" lang="pt-BR" altLang="pt-BR" sz="2200" b="0" i="0" u="none" strike="noStrike" cap="none" normalizeH="0" baseline="0" dirty="0">
                 <a:ln>
                   <a:noFill/>
                 </a:ln>
@@ -10445,7 +10570,7 @@
               <a:tabLst/>
             </a:pPr>
             <a:r>
-              <a:rPr kumimoji="0" lang="pt-BR" altLang="pt-BR" sz="1300" b="1" i="0" u="none" strike="noStrike" cap="none" normalizeH="0" baseline="0" dirty="0">
+              <a:rPr kumimoji="0" lang="pt-BR" altLang="pt-BR" sz="2200" b="1" i="0" u="none" strike="noStrike" cap="none" normalizeH="0" baseline="0" dirty="0">
                 <a:ln>
                   <a:noFill/>
                 </a:ln>
@@ -10458,7 +10583,7 @@
               </a:rPr>
               <a:t>$</a:t>
             </a:r>
-            <a:endParaRPr kumimoji="0" lang="pt-BR" altLang="pt-BR" sz="1300" b="0" i="0" u="none" strike="noStrike" cap="none" normalizeH="0" baseline="0" dirty="0">
+            <a:endParaRPr kumimoji="0" lang="pt-BR" altLang="pt-BR" sz="2200" b="0" i="0" u="none" strike="noStrike" cap="none" normalizeH="0" baseline="0" dirty="0">
               <a:ln>
                 <a:noFill/>
               </a:ln>
@@ -10488,7 +10613,7 @@
               <a:tabLst/>
             </a:pPr>
             <a:r>
-              <a:rPr kumimoji="0" lang="pt-BR" altLang="pt-BR" sz="1300" b="0" i="0" u="none" strike="noStrike" cap="none" normalizeH="0" baseline="0" dirty="0">
+              <a:rPr kumimoji="0" lang="pt-BR" altLang="pt-BR" sz="2200" b="0" i="0" u="none" strike="noStrike" cap="none" normalizeH="0" baseline="0" dirty="0">
                 <a:ln>
                   <a:noFill/>
                 </a:ln>
@@ -10502,7 +10627,7 @@
               <a:t>Indica o fim da </a:t>
             </a:r>
             <a:r>
-              <a:rPr kumimoji="0" lang="pt-BR" altLang="pt-BR" sz="1300" b="0" i="0" u="none" strike="noStrike" cap="none" normalizeH="0" baseline="0" dirty="0" err="1">
+              <a:rPr kumimoji="0" lang="pt-BR" altLang="pt-BR" sz="2200" b="0" i="0" u="none" strike="noStrike" cap="none" normalizeH="0" baseline="0" dirty="0" err="1">
                 <a:ln>
                   <a:noFill/>
                 </a:ln>
@@ -10516,7 +10641,7 @@
               <a:t>string</a:t>
             </a:r>
             <a:r>
-              <a:rPr kumimoji="0" lang="pt-BR" altLang="pt-BR" sz="1300" b="0" i="0" u="none" strike="noStrike" cap="none" normalizeH="0" baseline="0" dirty="0">
+              <a:rPr kumimoji="0" lang="pt-BR" altLang="pt-BR" sz="2200" b="0" i="0" u="none" strike="noStrike" cap="none" normalizeH="0" baseline="0" dirty="0">
                 <a:ln>
                   <a:noFill/>
                 </a:ln>

</xml_diff>